<commit_message>
Final version of project code
</commit_message>
<xml_diff>
--- a/project_code/fig.pptx
+++ b/project_code/fig.pptx
@@ -13,6 +13,8 @@
     <p:sldId id="261" r:id="rId7"/>
     <p:sldId id="262" r:id="rId8"/>
     <p:sldId id="263" r:id="rId9"/>
+    <p:sldId id="265" r:id="rId10"/>
+    <p:sldId id="264" r:id="rId11"/>
   </p:sldIdLst>
   <p:sldSz cx="12192000" cy="6858000"/>
   <p:notesSz cx="6858000" cy="9144000"/>
@@ -277,7 +279,7 @@
           <a:p>
             <a:fld id="{546A11C3-4E9D-447B-88AB-05069FBDD216}" type="datetimeFigureOut">
               <a:rPr lang="zh-CN" altLang="en-US" smtClean="0"/>
-              <a:t>2021/12/15</a:t>
+              <a:t>2021/12/17</a:t>
             </a:fld>
             <a:endParaRPr lang="zh-CN" altLang="en-US"/>
           </a:p>
@@ -475,7 +477,7 @@
           <a:p>
             <a:fld id="{546A11C3-4E9D-447B-88AB-05069FBDD216}" type="datetimeFigureOut">
               <a:rPr lang="zh-CN" altLang="en-US" smtClean="0"/>
-              <a:t>2021/12/15</a:t>
+              <a:t>2021/12/17</a:t>
             </a:fld>
             <a:endParaRPr lang="zh-CN" altLang="en-US"/>
           </a:p>
@@ -683,7 +685,7 @@
           <a:p>
             <a:fld id="{546A11C3-4E9D-447B-88AB-05069FBDD216}" type="datetimeFigureOut">
               <a:rPr lang="zh-CN" altLang="en-US" smtClean="0"/>
-              <a:t>2021/12/15</a:t>
+              <a:t>2021/12/17</a:t>
             </a:fld>
             <a:endParaRPr lang="zh-CN" altLang="en-US"/>
           </a:p>
@@ -881,7 +883,7 @@
           <a:p>
             <a:fld id="{546A11C3-4E9D-447B-88AB-05069FBDD216}" type="datetimeFigureOut">
               <a:rPr lang="zh-CN" altLang="en-US" smtClean="0"/>
-              <a:t>2021/12/15</a:t>
+              <a:t>2021/12/17</a:t>
             </a:fld>
             <a:endParaRPr lang="zh-CN" altLang="en-US"/>
           </a:p>
@@ -1156,7 +1158,7 @@
           <a:p>
             <a:fld id="{546A11C3-4E9D-447B-88AB-05069FBDD216}" type="datetimeFigureOut">
               <a:rPr lang="zh-CN" altLang="en-US" smtClean="0"/>
-              <a:t>2021/12/15</a:t>
+              <a:t>2021/12/17</a:t>
             </a:fld>
             <a:endParaRPr lang="zh-CN" altLang="en-US"/>
           </a:p>
@@ -1421,7 +1423,7 @@
           <a:p>
             <a:fld id="{546A11C3-4E9D-447B-88AB-05069FBDD216}" type="datetimeFigureOut">
               <a:rPr lang="zh-CN" altLang="en-US" smtClean="0"/>
-              <a:t>2021/12/15</a:t>
+              <a:t>2021/12/17</a:t>
             </a:fld>
             <a:endParaRPr lang="zh-CN" altLang="en-US"/>
           </a:p>
@@ -1833,7 +1835,7 @@
           <a:p>
             <a:fld id="{546A11C3-4E9D-447B-88AB-05069FBDD216}" type="datetimeFigureOut">
               <a:rPr lang="zh-CN" altLang="en-US" smtClean="0"/>
-              <a:t>2021/12/15</a:t>
+              <a:t>2021/12/17</a:t>
             </a:fld>
             <a:endParaRPr lang="zh-CN" altLang="en-US"/>
           </a:p>
@@ -1974,7 +1976,7 @@
           <a:p>
             <a:fld id="{546A11C3-4E9D-447B-88AB-05069FBDD216}" type="datetimeFigureOut">
               <a:rPr lang="zh-CN" altLang="en-US" smtClean="0"/>
-              <a:t>2021/12/15</a:t>
+              <a:t>2021/12/17</a:t>
             </a:fld>
             <a:endParaRPr lang="zh-CN" altLang="en-US"/>
           </a:p>
@@ -2087,7 +2089,7 @@
           <a:p>
             <a:fld id="{546A11C3-4E9D-447B-88AB-05069FBDD216}" type="datetimeFigureOut">
               <a:rPr lang="zh-CN" altLang="en-US" smtClean="0"/>
-              <a:t>2021/12/15</a:t>
+              <a:t>2021/12/17</a:t>
             </a:fld>
             <a:endParaRPr lang="zh-CN" altLang="en-US"/>
           </a:p>
@@ -2398,7 +2400,7 @@
           <a:p>
             <a:fld id="{546A11C3-4E9D-447B-88AB-05069FBDD216}" type="datetimeFigureOut">
               <a:rPr lang="zh-CN" altLang="en-US" smtClean="0"/>
-              <a:t>2021/12/15</a:t>
+              <a:t>2021/12/17</a:t>
             </a:fld>
             <a:endParaRPr lang="zh-CN" altLang="en-US"/>
           </a:p>
@@ -2686,7 +2688,7 @@
           <a:p>
             <a:fld id="{546A11C3-4E9D-447B-88AB-05069FBDD216}" type="datetimeFigureOut">
               <a:rPr lang="zh-CN" altLang="en-US" smtClean="0"/>
-              <a:t>2021/12/15</a:t>
+              <a:t>2021/12/17</a:t>
             </a:fld>
             <a:endParaRPr lang="zh-CN" altLang="en-US"/>
           </a:p>
@@ -2927,7 +2929,7 @@
           <a:p>
             <a:fld id="{546A11C3-4E9D-447B-88AB-05069FBDD216}" type="datetimeFigureOut">
               <a:rPr lang="zh-CN" altLang="en-US" smtClean="0"/>
-              <a:t>2021/12/15</a:t>
+              <a:t>2021/12/17</a:t>
             </a:fld>
             <a:endParaRPr lang="zh-CN" altLang="en-US"/>
           </a:p>
@@ -12133,6 +12135,96 @@
 </p:sld>
 </file>
 
+<file path=ppt/slides/slide10.xml><?xml version="1.0" encoding="utf-8"?>
+<p:sld xmlns:a="http://schemas.openxmlformats.org/drawingml/2006/main" xmlns:r="http://schemas.openxmlformats.org/officeDocument/2006/relationships" xmlns:p="http://schemas.openxmlformats.org/presentationml/2006/main">
+  <p:cSld>
+    <p:spTree>
+      <p:nvGrpSpPr>
+        <p:cNvPr id="1" name=""/>
+        <p:cNvGrpSpPr/>
+        <p:nvPr/>
+      </p:nvGrpSpPr>
+      <p:grpSpPr>
+        <a:xfrm>
+          <a:off x="0" y="0"/>
+          <a:ext cx="0" cy="0"/>
+          <a:chOff x="0" y="0"/>
+          <a:chExt cx="0" cy="0"/>
+        </a:xfrm>
+      </p:grpSpPr>
+      <p:pic>
+        <p:nvPicPr>
+          <p:cNvPr id="5" name="图片 4">
+            <a:extLst>
+              <a:ext uri="{FF2B5EF4-FFF2-40B4-BE49-F238E27FC236}">
+                <a16:creationId xmlns:a16="http://schemas.microsoft.com/office/drawing/2014/main" id="{72AC4939-DAEF-4FE1-9FAB-748ED76E2284}"/>
+              </a:ext>
+            </a:extLst>
+          </p:cNvPr>
+          <p:cNvPicPr>
+            <a:picLocks noChangeAspect="1"/>
+          </p:cNvPicPr>
+          <p:nvPr/>
+        </p:nvPicPr>
+        <p:blipFill>
+          <a:blip r:embed="rId2"/>
+          <a:stretch>
+            <a:fillRect/>
+          </a:stretch>
+        </p:blipFill>
+        <p:spPr>
+          <a:xfrm>
+            <a:off x="952667" y="1615643"/>
+            <a:ext cx="4939682" cy="3339682"/>
+          </a:xfrm>
+          <a:prstGeom prst="rect">
+            <a:avLst/>
+          </a:prstGeom>
+        </p:spPr>
+      </p:pic>
+      <p:pic>
+        <p:nvPicPr>
+          <p:cNvPr id="7" name="图片 6">
+            <a:extLst>
+              <a:ext uri="{FF2B5EF4-FFF2-40B4-BE49-F238E27FC236}">
+                <a16:creationId xmlns:a16="http://schemas.microsoft.com/office/drawing/2014/main" id="{A63AB169-460A-40E2-8FDF-78D1BF1CF9E7}"/>
+              </a:ext>
+            </a:extLst>
+          </p:cNvPr>
+          <p:cNvPicPr>
+            <a:picLocks noChangeAspect="1"/>
+          </p:cNvPicPr>
+          <p:nvPr/>
+        </p:nvPicPr>
+        <p:blipFill>
+          <a:blip r:embed="rId3"/>
+          <a:stretch>
+            <a:fillRect/>
+          </a:stretch>
+        </p:blipFill>
+        <p:spPr>
+          <a:xfrm>
+            <a:off x="6006816" y="1628341"/>
+            <a:ext cx="5168254" cy="3326984"/>
+          </a:xfrm>
+          <a:prstGeom prst="rect">
+            <a:avLst/>
+          </a:prstGeom>
+        </p:spPr>
+      </p:pic>
+    </p:spTree>
+    <p:extLst>
+      <p:ext uri="{BB962C8B-B14F-4D97-AF65-F5344CB8AC3E}">
+        <p14:creationId xmlns:p14="http://schemas.microsoft.com/office/powerpoint/2010/main" val="2121099415"/>
+      </p:ext>
+    </p:extLst>
+  </p:cSld>
+  <p:clrMapOvr>
+    <a:masterClrMapping/>
+  </p:clrMapOvr>
+</p:sld>
+</file>
+
 <file path=ppt/slides/slide2.xml><?xml version="1.0" encoding="utf-8"?>
 <p:sld xmlns:a="http://schemas.openxmlformats.org/drawingml/2006/main" xmlns:r="http://schemas.openxmlformats.org/officeDocument/2006/relationships" xmlns:p="http://schemas.openxmlformats.org/presentationml/2006/main">
   <p:cSld>
@@ -24266,35 +24358,6 @@
       </p:grpSpPr>
       <p:pic>
         <p:nvPicPr>
-          <p:cNvPr id="5" name="内容占位符 4">
-            <a:extLst>
-              <a:ext uri="{FF2B5EF4-FFF2-40B4-BE49-F238E27FC236}">
-                <a16:creationId xmlns:a16="http://schemas.microsoft.com/office/drawing/2014/main" id="{9EB6F080-3900-4907-B265-F5A2998DB8F6}"/>
-              </a:ext>
-            </a:extLst>
-          </p:cNvPr>
-          <p:cNvPicPr>
-            <a:picLocks noGrp="1" noChangeAspect="1"/>
-          </p:cNvPicPr>
-          <p:nvPr>
-            <p:ph idx="1"/>
-          </p:nvPr>
-        </p:nvPicPr>
-        <p:blipFill>
-          <a:blip r:embed="rId2"/>
-          <a:stretch>
-            <a:fillRect/>
-          </a:stretch>
-        </p:blipFill>
-        <p:spPr>
-          <a:xfrm>
-            <a:off x="5011846" y="365125"/>
-            <a:ext cx="5461081" cy="3669846"/>
-          </a:xfrm>
-        </p:spPr>
-      </p:pic>
-      <p:pic>
-        <p:nvPicPr>
           <p:cNvPr id="1026" name="Picture 2">
             <a:extLst>
               <a:ext uri="{FF2B5EF4-FFF2-40B4-BE49-F238E27FC236}">
@@ -24308,7 +24371,7 @@
           <p:nvPr/>
         </p:nvPicPr>
         <p:blipFill>
-          <a:blip r:embed="rId3">
+          <a:blip r:embed="rId2">
             <a:extLst>
               <a:ext uri="{28A0092B-C50C-407E-A947-70E740481C1C}">
                 <a14:useLocalDpi xmlns:a14="http://schemas.microsoft.com/office/drawing/2010/main" val="0"/>
@@ -24391,7 +24454,7 @@
         </p:nvSpPr>
         <p:spPr>
           <a:xfrm>
-            <a:off x="5871028" y="4202567"/>
+            <a:off x="5300617" y="4202567"/>
             <a:ext cx="4296229" cy="369332"/>
           </a:xfrm>
           <a:prstGeom prst="rect">
@@ -24414,10 +24477,271 @@
           </a:p>
         </p:txBody>
       </p:sp>
+      <p:pic>
+        <p:nvPicPr>
+          <p:cNvPr id="7" name="图片 6">
+            <a:extLst>
+              <a:ext uri="{FF2B5EF4-FFF2-40B4-BE49-F238E27FC236}">
+                <a16:creationId xmlns:a16="http://schemas.microsoft.com/office/drawing/2014/main" id="{11BEC8FD-414C-4F95-BEDD-79C0C3CC8552}"/>
+              </a:ext>
+            </a:extLst>
+          </p:cNvPr>
+          <p:cNvPicPr>
+            <a:picLocks noChangeAspect="1"/>
+          </p:cNvPicPr>
+          <p:nvPr/>
+        </p:nvPicPr>
+        <p:blipFill>
+          <a:blip r:embed="rId3"/>
+          <a:stretch>
+            <a:fillRect/>
+          </a:stretch>
+        </p:blipFill>
+        <p:spPr>
+          <a:xfrm>
+            <a:off x="5162265" y="434449"/>
+            <a:ext cx="4715804" cy="3600521"/>
+          </a:xfrm>
+          <a:prstGeom prst="rect">
+            <a:avLst/>
+          </a:prstGeom>
+        </p:spPr>
+      </p:pic>
     </p:spTree>
     <p:extLst>
       <p:ext uri="{BB962C8B-B14F-4D97-AF65-F5344CB8AC3E}">
         <p14:creationId xmlns:p14="http://schemas.microsoft.com/office/powerpoint/2010/main" val="3733029476"/>
+      </p:ext>
+    </p:extLst>
+  </p:cSld>
+  <p:clrMapOvr>
+    <a:masterClrMapping/>
+  </p:clrMapOvr>
+</p:sld>
+</file>
+
+<file path=ppt/slides/slide9.xml><?xml version="1.0" encoding="utf-8"?>
+<p:sld xmlns:a="http://schemas.openxmlformats.org/drawingml/2006/main" xmlns:r="http://schemas.openxmlformats.org/officeDocument/2006/relationships" xmlns:p="http://schemas.openxmlformats.org/presentationml/2006/main">
+  <p:cSld>
+    <p:spTree>
+      <p:nvGrpSpPr>
+        <p:cNvPr id="1" name=""/>
+        <p:cNvGrpSpPr/>
+        <p:nvPr/>
+      </p:nvGrpSpPr>
+      <p:grpSpPr>
+        <a:xfrm>
+          <a:off x="0" y="0"/>
+          <a:ext cx="0" cy="0"/>
+          <a:chOff x="0" y="0"/>
+          <a:chExt cx="0" cy="0"/>
+        </a:xfrm>
+      </p:grpSpPr>
+      <p:pic>
+        <p:nvPicPr>
+          <p:cNvPr id="5" name="图片 4">
+            <a:extLst>
+              <a:ext uri="{FF2B5EF4-FFF2-40B4-BE49-F238E27FC236}">
+                <a16:creationId xmlns:a16="http://schemas.microsoft.com/office/drawing/2014/main" id="{7B2A74DD-E088-4EBC-B37C-AACB10CF4C6D}"/>
+              </a:ext>
+            </a:extLst>
+          </p:cNvPr>
+          <p:cNvPicPr>
+            <a:picLocks noChangeAspect="1"/>
+          </p:cNvPicPr>
+          <p:nvPr/>
+        </p:nvPicPr>
+        <p:blipFill>
+          <a:blip r:embed="rId2"/>
+          <a:stretch>
+            <a:fillRect/>
+          </a:stretch>
+        </p:blipFill>
+        <p:spPr>
+          <a:xfrm>
+            <a:off x="0" y="984068"/>
+            <a:ext cx="3735861" cy="3824284"/>
+          </a:xfrm>
+          <a:prstGeom prst="rect">
+            <a:avLst/>
+          </a:prstGeom>
+        </p:spPr>
+      </p:pic>
+      <p:pic>
+        <p:nvPicPr>
+          <p:cNvPr id="7" name="图片 6">
+            <a:extLst>
+              <a:ext uri="{FF2B5EF4-FFF2-40B4-BE49-F238E27FC236}">
+                <a16:creationId xmlns:a16="http://schemas.microsoft.com/office/drawing/2014/main" id="{79E5C77B-1506-492C-BC6A-17DDAE85C7E0}"/>
+              </a:ext>
+            </a:extLst>
+          </p:cNvPr>
+          <p:cNvPicPr>
+            <a:picLocks noChangeAspect="1"/>
+          </p:cNvPicPr>
+          <p:nvPr/>
+        </p:nvPicPr>
+        <p:blipFill>
+          <a:blip r:embed="rId3"/>
+          <a:stretch>
+            <a:fillRect/>
+          </a:stretch>
+        </p:blipFill>
+        <p:spPr>
+          <a:xfrm>
+            <a:off x="3735861" y="1027906"/>
+            <a:ext cx="3765336" cy="3824284"/>
+          </a:xfrm>
+          <a:prstGeom prst="rect">
+            <a:avLst/>
+          </a:prstGeom>
+        </p:spPr>
+      </p:pic>
+      <p:pic>
+        <p:nvPicPr>
+          <p:cNvPr id="9" name="图片 8">
+            <a:extLst>
+              <a:ext uri="{FF2B5EF4-FFF2-40B4-BE49-F238E27FC236}">
+                <a16:creationId xmlns:a16="http://schemas.microsoft.com/office/drawing/2014/main" id="{5462E528-E5AA-4BAF-B6AC-6042C7A290E0}"/>
+              </a:ext>
+            </a:extLst>
+          </p:cNvPr>
+          <p:cNvPicPr>
+            <a:picLocks noChangeAspect="1"/>
+          </p:cNvPicPr>
+          <p:nvPr/>
+        </p:nvPicPr>
+        <p:blipFill>
+          <a:blip r:embed="rId4"/>
+          <a:stretch>
+            <a:fillRect/>
+          </a:stretch>
+        </p:blipFill>
+        <p:spPr>
+          <a:xfrm>
+            <a:off x="7501197" y="984068"/>
+            <a:ext cx="3765336" cy="3869721"/>
+          </a:xfrm>
+          <a:prstGeom prst="rect">
+            <a:avLst/>
+          </a:prstGeom>
+        </p:spPr>
+      </p:pic>
+      <p:sp>
+        <p:nvSpPr>
+          <p:cNvPr id="10" name="文本框 9">
+            <a:extLst>
+              <a:ext uri="{FF2B5EF4-FFF2-40B4-BE49-F238E27FC236}">
+                <a16:creationId xmlns:a16="http://schemas.microsoft.com/office/drawing/2014/main" id="{459A4447-CB8F-4274-A9E6-530D0EC29390}"/>
+              </a:ext>
+            </a:extLst>
+          </p:cNvPr>
+          <p:cNvSpPr txBox="1"/>
+          <p:nvPr/>
+        </p:nvSpPr>
+        <p:spPr>
+          <a:xfrm>
+            <a:off x="463006" y="4808352"/>
+            <a:ext cx="3229430" cy="369332"/>
+          </a:xfrm>
+          <a:prstGeom prst="rect">
+            <a:avLst/>
+          </a:prstGeom>
+          <a:noFill/>
+        </p:spPr>
+        <p:txBody>
+          <a:bodyPr wrap="square" rtlCol="0">
+            <a:spAutoFit/>
+          </a:bodyPr>
+          <a:lstStyle/>
+          <a:p>
+            <a:pPr algn="ctr"/>
+            <a:r>
+              <a:rPr lang="en-US" altLang="zh-CN" dirty="0"/>
+              <a:t>u velocity</a:t>
+            </a:r>
+            <a:endParaRPr lang="zh-CN" altLang="en-US" dirty="0"/>
+          </a:p>
+        </p:txBody>
+      </p:sp>
+      <p:sp>
+        <p:nvSpPr>
+          <p:cNvPr id="11" name="文本框 10">
+            <a:extLst>
+              <a:ext uri="{FF2B5EF4-FFF2-40B4-BE49-F238E27FC236}">
+                <a16:creationId xmlns:a16="http://schemas.microsoft.com/office/drawing/2014/main" id="{1CF15511-D762-4D88-A233-62413E168655}"/>
+              </a:ext>
+            </a:extLst>
+          </p:cNvPr>
+          <p:cNvSpPr txBox="1"/>
+          <p:nvPr/>
+        </p:nvSpPr>
+        <p:spPr>
+          <a:xfrm>
+            <a:off x="4155442" y="4808352"/>
+            <a:ext cx="3229430" cy="369332"/>
+          </a:xfrm>
+          <a:prstGeom prst="rect">
+            <a:avLst/>
+          </a:prstGeom>
+          <a:noFill/>
+        </p:spPr>
+        <p:txBody>
+          <a:bodyPr wrap="square" rtlCol="0">
+            <a:spAutoFit/>
+          </a:bodyPr>
+          <a:lstStyle/>
+          <a:p>
+            <a:pPr algn="ctr"/>
+            <a:r>
+              <a:rPr lang="en-US" altLang="zh-CN" dirty="0"/>
+              <a:t>v velocity</a:t>
+            </a:r>
+            <a:endParaRPr lang="zh-CN" altLang="en-US" dirty="0"/>
+          </a:p>
+        </p:txBody>
+      </p:sp>
+      <p:sp>
+        <p:nvSpPr>
+          <p:cNvPr id="12" name="文本框 11">
+            <a:extLst>
+              <a:ext uri="{FF2B5EF4-FFF2-40B4-BE49-F238E27FC236}">
+                <a16:creationId xmlns:a16="http://schemas.microsoft.com/office/drawing/2014/main" id="{FFCDC208-FCB4-4BA5-B001-17D2D2F78066}"/>
+              </a:ext>
+            </a:extLst>
+          </p:cNvPr>
+          <p:cNvSpPr txBox="1"/>
+          <p:nvPr/>
+        </p:nvSpPr>
+        <p:spPr>
+          <a:xfrm>
+            <a:off x="8037103" y="4808352"/>
+            <a:ext cx="3229430" cy="369332"/>
+          </a:xfrm>
+          <a:prstGeom prst="rect">
+            <a:avLst/>
+          </a:prstGeom>
+          <a:noFill/>
+        </p:spPr>
+        <p:txBody>
+          <a:bodyPr wrap="square" rtlCol="0">
+            <a:spAutoFit/>
+          </a:bodyPr>
+          <a:lstStyle/>
+          <a:p>
+            <a:pPr algn="ctr"/>
+            <a:r>
+              <a:rPr lang="en-US" altLang="zh-CN" dirty="0"/>
+              <a:t>pressure velocity</a:t>
+            </a:r>
+            <a:endParaRPr lang="zh-CN" altLang="en-US" dirty="0"/>
+          </a:p>
+        </p:txBody>
+      </p:sp>
+    </p:spTree>
+    <p:extLst>
+      <p:ext uri="{BB962C8B-B14F-4D97-AF65-F5344CB8AC3E}">
+        <p14:creationId xmlns:p14="http://schemas.microsoft.com/office/powerpoint/2010/main" val="2452309314"/>
       </p:ext>
     </p:extLst>
   </p:cSld>

</xml_diff>